<commit_message>
Added pdf for CAI Report
English version
</commit_message>
<xml_diff>
--- a/cys/CAI Analysis Report.pptx
+++ b/cys/CAI Analysis Report.pptx
@@ -19954,13 +19954,6 @@
           <a:p>
             <a:pPr lvl="1"/>
             <a:r>
-              <a:rPr lang="ko-KR" altLang="en-US" sz="1100" dirty="0">
-                <a:latin typeface="-윤고딕320" panose="02030504000101010101" pitchFamily="18" charset="-127"/>
-                <a:ea typeface="-윤고딕320" panose="02030504000101010101" pitchFamily="18" charset="-127"/>
-              </a:rPr>
-              <a:t> </a:t>
-            </a:r>
-            <a:r>
               <a:rPr lang="en-US" altLang="ko-KR" sz="1100" dirty="0">
                 <a:latin typeface="-윤고딕320" panose="02030504000101010101" pitchFamily="18" charset="-127"/>
                 <a:ea typeface="-윤고딕320" panose="02030504000101010101" pitchFamily="18" charset="-127"/>
@@ -22558,7 +22551,7 @@
                 <a:latin typeface="-윤고딕320" panose="02030504000101010101" pitchFamily="18" charset="-127"/>
                 <a:ea typeface="-윤고딕320" panose="02030504000101010101" pitchFamily="18" charset="-127"/>
               </a:rPr>
-              <a:t> Is the cheek the representative skin tone of the face?</a:t>
+              <a:t>Is the cheek the representative skin tone of the face?</a:t>
             </a:r>
           </a:p>
         </p:txBody>

</xml_diff>